<commit_message>
Hardware: add design files
</commit_message>
<xml_diff>
--- a/Hardware/Tympan A Board/2017-02-10 Tympan A.pptx
+++ b/Hardware/Tympan A Board/2017-02-10 Tympan A.pptx
@@ -292,7 +292,7 @@
           <a:p>
             <a:fld id="{1A97538D-E682-4CE9-AA1E-9E02509CBF1E}" type="datetimeFigureOut">
               <a:rPr lang="en-US" smtClean="0"/>
-              <a:t>2/10/2017</a:t>
+              <a:t>2/16/2017</a:t>
             </a:fld>
             <a:endParaRPr lang="en-US"/>
           </a:p>
@@ -462,7 +462,7 @@
           <a:p>
             <a:fld id="{1A97538D-E682-4CE9-AA1E-9E02509CBF1E}" type="datetimeFigureOut">
               <a:rPr lang="en-US" smtClean="0"/>
-              <a:t>2/10/2017</a:t>
+              <a:t>2/16/2017</a:t>
             </a:fld>
             <a:endParaRPr lang="en-US"/>
           </a:p>
@@ -642,7 +642,7 @@
           <a:p>
             <a:fld id="{1A97538D-E682-4CE9-AA1E-9E02509CBF1E}" type="datetimeFigureOut">
               <a:rPr lang="en-US" smtClean="0"/>
-              <a:t>2/10/2017</a:t>
+              <a:t>2/16/2017</a:t>
             </a:fld>
             <a:endParaRPr lang="en-US"/>
           </a:p>
@@ -812,7 +812,7 @@
           <a:p>
             <a:fld id="{1A97538D-E682-4CE9-AA1E-9E02509CBF1E}" type="datetimeFigureOut">
               <a:rPr lang="en-US" smtClean="0"/>
-              <a:t>2/10/2017</a:t>
+              <a:t>2/16/2017</a:t>
             </a:fld>
             <a:endParaRPr lang="en-US"/>
           </a:p>
@@ -1058,7 +1058,7 @@
           <a:p>
             <a:fld id="{1A97538D-E682-4CE9-AA1E-9E02509CBF1E}" type="datetimeFigureOut">
               <a:rPr lang="en-US" smtClean="0"/>
-              <a:t>2/10/2017</a:t>
+              <a:t>2/16/2017</a:t>
             </a:fld>
             <a:endParaRPr lang="en-US"/>
           </a:p>
@@ -1346,7 +1346,7 @@
           <a:p>
             <a:fld id="{1A97538D-E682-4CE9-AA1E-9E02509CBF1E}" type="datetimeFigureOut">
               <a:rPr lang="en-US" smtClean="0"/>
-              <a:t>2/10/2017</a:t>
+              <a:t>2/16/2017</a:t>
             </a:fld>
             <a:endParaRPr lang="en-US"/>
           </a:p>
@@ -1768,7 +1768,7 @@
           <a:p>
             <a:fld id="{1A97538D-E682-4CE9-AA1E-9E02509CBF1E}" type="datetimeFigureOut">
               <a:rPr lang="en-US" smtClean="0"/>
-              <a:t>2/10/2017</a:t>
+              <a:t>2/16/2017</a:t>
             </a:fld>
             <a:endParaRPr lang="en-US"/>
           </a:p>
@@ -1886,7 +1886,7 @@
           <a:p>
             <a:fld id="{1A97538D-E682-4CE9-AA1E-9E02509CBF1E}" type="datetimeFigureOut">
               <a:rPr lang="en-US" smtClean="0"/>
-              <a:t>2/10/2017</a:t>
+              <a:t>2/16/2017</a:t>
             </a:fld>
             <a:endParaRPr lang="en-US"/>
           </a:p>
@@ -1981,7 +1981,7 @@
           <a:p>
             <a:fld id="{1A97538D-E682-4CE9-AA1E-9E02509CBF1E}" type="datetimeFigureOut">
               <a:rPr lang="en-US" smtClean="0"/>
-              <a:t>2/10/2017</a:t>
+              <a:t>2/16/2017</a:t>
             </a:fld>
             <a:endParaRPr lang="en-US"/>
           </a:p>
@@ -2258,7 +2258,7 @@
           <a:p>
             <a:fld id="{1A97538D-E682-4CE9-AA1E-9E02509CBF1E}" type="datetimeFigureOut">
               <a:rPr lang="en-US" smtClean="0"/>
-              <a:t>2/10/2017</a:t>
+              <a:t>2/16/2017</a:t>
             </a:fld>
             <a:endParaRPr lang="en-US"/>
           </a:p>
@@ -2511,7 +2511,7 @@
           <a:p>
             <a:fld id="{1A97538D-E682-4CE9-AA1E-9E02509CBF1E}" type="datetimeFigureOut">
               <a:rPr lang="en-US" smtClean="0"/>
-              <a:t>2/10/2017</a:t>
+              <a:t>2/16/2017</a:t>
             </a:fld>
             <a:endParaRPr lang="en-US"/>
           </a:p>
@@ -2724,7 +2724,7 @@
           <a:p>
             <a:fld id="{1A97538D-E682-4CE9-AA1E-9E02509CBF1E}" type="datetimeFigureOut">
               <a:rPr lang="en-US" smtClean="0"/>
-              <a:t>2/10/2017</a:t>
+              <a:t>2/16/2017</a:t>
             </a:fld>
             <a:endParaRPr lang="en-US"/>
           </a:p>
@@ -3201,6 +3201,777 @@
           <a:chExt cx="0" cy="0"/>
         </a:xfrm>
       </p:grpSpPr>
+      <p:grpSp>
+        <p:nvGrpSpPr>
+          <p:cNvPr id="4" name="Group 3"/>
+          <p:cNvGrpSpPr/>
+          <p:nvPr/>
+        </p:nvGrpSpPr>
+        <p:grpSpPr>
+          <a:xfrm>
+            <a:off x="1739900" y="1371600"/>
+            <a:ext cx="5486400" cy="4978400"/>
+            <a:chOff x="1739900" y="1371600"/>
+            <a:chExt cx="5486400" cy="4978400"/>
+          </a:xfrm>
+        </p:grpSpPr>
+        <p:sp>
+          <p:nvSpPr>
+            <p:cNvPr id="2" name="Rectangle 1"/>
+            <p:cNvSpPr/>
+            <p:nvPr/>
+          </p:nvSpPr>
+          <p:spPr>
+            <a:xfrm>
+              <a:off x="1739900" y="1371600"/>
+              <a:ext cx="5486400" cy="4978400"/>
+            </a:xfrm>
+            <a:prstGeom prst="rect">
+              <a:avLst/>
+            </a:prstGeom>
+            <a:solidFill>
+              <a:schemeClr val="bg1"/>
+            </a:solidFill>
+            <a:ln>
+              <a:noFill/>
+            </a:ln>
+          </p:spPr>
+          <p:style>
+            <a:lnRef idx="2">
+              <a:schemeClr val="accent1">
+                <a:shade val="50000"/>
+              </a:schemeClr>
+            </a:lnRef>
+            <a:fillRef idx="1">
+              <a:schemeClr val="accent1"/>
+            </a:fillRef>
+            <a:effectRef idx="0">
+              <a:schemeClr val="accent1"/>
+            </a:effectRef>
+            <a:fontRef idx="minor">
+              <a:schemeClr val="lt1"/>
+            </a:fontRef>
+          </p:style>
+          <p:txBody>
+            <a:bodyPr rtlCol="0" anchor="ctr"/>
+            <a:lstStyle/>
+            <a:p>
+              <a:pPr algn="ctr"/>
+              <a:endParaRPr lang="en-US"/>
+            </a:p>
+          </p:txBody>
+        </p:sp>
+        <p:grpSp>
+          <p:nvGrpSpPr>
+            <p:cNvPr id="2056" name="Group 2055"/>
+            <p:cNvGrpSpPr/>
+            <p:nvPr/>
+          </p:nvGrpSpPr>
+          <p:grpSpPr>
+            <a:xfrm>
+              <a:off x="1871133" y="1467631"/>
+              <a:ext cx="5252156" cy="4744127"/>
+              <a:chOff x="1905000" y="1478920"/>
+              <a:chExt cx="5252156" cy="4744127"/>
+            </a:xfrm>
+          </p:grpSpPr>
+          <p:pic>
+            <p:nvPicPr>
+              <p:cNvPr id="2051" name="Picture 3" descr="C:\Users\wea\Desktop\2017-02-10 Tympan A to BTNRH\IMG_7257.JPG"/>
+              <p:cNvPicPr>
+                <a:picLocks noChangeAspect="1" noChangeArrowheads="1"/>
+              </p:cNvPicPr>
+              <p:nvPr/>
+            </p:nvPicPr>
+            <p:blipFill rotWithShape="1">
+              <a:blip r:embed="rId2">
+                <a:extLst>
+                  <a:ext uri="{BEBA8EAE-BF5A-486C-A8C5-ECC9F3942E4B}">
+                    <a14:imgProps xmlns:a14="http://schemas.microsoft.com/office/drawing/2010/main">
+                      <a14:imgLayer r:embed="rId3">
+                        <a14:imgEffect>
+                          <a14:backgroundRemoval t="10000" b="99250" l="6583" r="75917">
+                            <a14:foregroundMark x1="61333" y1="44500" x2="62833" y2="39250"/>
+                            <a14:foregroundMark x1="61083" y1="65250" x2="61167" y2="60875"/>
+                            <a14:foregroundMark x1="59167" y1="77750" x2="58833" y2="75125"/>
+                            <a14:foregroundMark x1="48167" y1="88125" x2="30250" y2="96000"/>
+                            <a14:foregroundMark x1="13000" y1="95250" x2="24500" y2="66625"/>
+                            <a14:foregroundMark x1="38417" y1="99250" x2="14417" y2="98125"/>
+                            <a14:foregroundMark x1="6583" y1="99250" x2="10500" y2="88500"/>
+                          </a14:backgroundRemoval>
+                        </a14:imgEffect>
+                      </a14:imgLayer>
+                    </a14:imgProps>
+                  </a:ext>
+                  <a:ext uri="{28A0092B-C50C-407E-A947-70E740481C1C}">
+                    <a14:useLocalDpi xmlns:a14="http://schemas.microsoft.com/office/drawing/2010/main" val="0"/>
+                  </a:ext>
+                </a:extLst>
+              </a:blip>
+              <a:srcRect l="22962" r="17953" b="9952"/>
+              <a:stretch/>
+            </p:blipFill>
+            <p:spPr bwMode="auto">
+              <a:xfrm>
+                <a:off x="2362200" y="1478920"/>
+                <a:ext cx="4566356" cy="4639658"/>
+              </a:xfrm>
+              <a:prstGeom prst="rect">
+                <a:avLst/>
+              </a:prstGeom>
+              <a:noFill/>
+              <a:extLst>
+                <a:ext uri="{909E8E84-426E-40DD-AFC4-6F175D3DCCD1}">
+                  <a14:hiddenFill xmlns:a14="http://schemas.microsoft.com/office/drawing/2010/main">
+                    <a:solidFill>
+                      <a:srgbClr val="FFFFFF"/>
+                    </a:solidFill>
+                  </a14:hiddenFill>
+                </a:ext>
+              </a:extLst>
+            </p:spPr>
+          </p:pic>
+          <p:sp>
+            <p:nvSpPr>
+              <p:cNvPr id="5" name="TextBox 4"/>
+              <p:cNvSpPr txBox="1"/>
+              <p:nvPr/>
+            </p:nvSpPr>
+            <p:spPr>
+              <a:xfrm>
+                <a:off x="2362200" y="1715869"/>
+                <a:ext cx="1219200" cy="646331"/>
+              </a:xfrm>
+              <a:prstGeom prst="rect">
+                <a:avLst/>
+              </a:prstGeom>
+              <a:noFill/>
+            </p:spPr>
+            <p:txBody>
+              <a:bodyPr wrap="square" rtlCol="0">
+                <a:spAutoFit/>
+              </a:bodyPr>
+              <a:lstStyle/>
+              <a:p>
+                <a:pPr algn="ctr"/>
+                <a:r>
+                  <a:rPr lang="en-US" b="1" dirty="0" smtClean="0"/>
+                  <a:t>Line-In / Mic Jack</a:t>
+                </a:r>
+                <a:endParaRPr lang="en-US" b="1" dirty="0"/>
+              </a:p>
+            </p:txBody>
+          </p:sp>
+          <p:sp>
+            <p:nvSpPr>
+              <p:cNvPr id="8" name="TextBox 7"/>
+              <p:cNvSpPr txBox="1"/>
+              <p:nvPr/>
+            </p:nvSpPr>
+            <p:spPr>
+              <a:xfrm>
+                <a:off x="5715000" y="1715869"/>
+                <a:ext cx="1442156" cy="646331"/>
+              </a:xfrm>
+              <a:prstGeom prst="rect">
+                <a:avLst/>
+              </a:prstGeom>
+              <a:noFill/>
+            </p:spPr>
+            <p:txBody>
+              <a:bodyPr wrap="square" rtlCol="0">
+                <a:spAutoFit/>
+              </a:bodyPr>
+              <a:lstStyle/>
+              <a:p>
+                <a:pPr algn="ctr"/>
+                <a:r>
+                  <a:rPr lang="en-US" b="1" dirty="0" smtClean="0"/>
+                  <a:t>Headphone Jack</a:t>
+                </a:r>
+                <a:endParaRPr lang="en-US" b="1" dirty="0"/>
+              </a:p>
+            </p:txBody>
+          </p:sp>
+          <p:sp>
+            <p:nvSpPr>
+              <p:cNvPr id="9" name="TextBox 8"/>
+              <p:cNvSpPr txBox="1"/>
+              <p:nvPr/>
+            </p:nvSpPr>
+            <p:spPr>
+              <a:xfrm>
+                <a:off x="3575756" y="1498793"/>
+                <a:ext cx="2139244" cy="646331"/>
+              </a:xfrm>
+              <a:prstGeom prst="rect">
+                <a:avLst/>
+              </a:prstGeom>
+              <a:noFill/>
+            </p:spPr>
+            <p:txBody>
+              <a:bodyPr wrap="square" rtlCol="0">
+                <a:spAutoFit/>
+              </a:bodyPr>
+              <a:lstStyle/>
+              <a:p>
+                <a:pPr algn="ctr"/>
+                <a:r>
+                  <a:rPr lang="en-US" b="1" dirty="0" smtClean="0"/>
+                  <a:t>USB to</a:t>
+                </a:r>
+              </a:p>
+              <a:p>
+                <a:pPr algn="ctr"/>
+                <a:r>
+                  <a:rPr lang="en-US" b="1" dirty="0" smtClean="0"/>
+                  <a:t>Program/Recharge</a:t>
+                </a:r>
+              </a:p>
+            </p:txBody>
+          </p:sp>
+          <p:sp>
+            <p:nvSpPr>
+              <p:cNvPr id="10" name="TextBox 9"/>
+              <p:cNvSpPr txBox="1"/>
+              <p:nvPr/>
+            </p:nvSpPr>
+            <p:spPr>
+              <a:xfrm>
+                <a:off x="1981200" y="2590800"/>
+                <a:ext cx="1442156" cy="646331"/>
+              </a:xfrm>
+              <a:prstGeom prst="rect">
+                <a:avLst/>
+              </a:prstGeom>
+              <a:noFill/>
+            </p:spPr>
+            <p:txBody>
+              <a:bodyPr wrap="square" rtlCol="0">
+                <a:spAutoFit/>
+              </a:bodyPr>
+              <a:lstStyle/>
+              <a:p>
+                <a:pPr algn="ctr"/>
+                <a:r>
+                  <a:rPr lang="en-US" b="1" dirty="0" smtClean="0"/>
+                  <a:t>On-Board Mic</a:t>
+                </a:r>
+              </a:p>
+            </p:txBody>
+          </p:sp>
+          <p:sp>
+            <p:nvSpPr>
+              <p:cNvPr id="11" name="TextBox 10"/>
+              <p:cNvSpPr txBox="1"/>
+              <p:nvPr/>
+            </p:nvSpPr>
+            <p:spPr>
+              <a:xfrm>
+                <a:off x="1905000" y="3385318"/>
+                <a:ext cx="1442156" cy="646331"/>
+              </a:xfrm>
+              <a:prstGeom prst="rect">
+                <a:avLst/>
+              </a:prstGeom>
+              <a:noFill/>
+            </p:spPr>
+            <p:txBody>
+              <a:bodyPr wrap="square" rtlCol="0">
+                <a:spAutoFit/>
+              </a:bodyPr>
+              <a:lstStyle/>
+              <a:p>
+                <a:pPr algn="ctr"/>
+                <a:r>
+                  <a:rPr lang="en-US" b="1" dirty="0" smtClean="0"/>
+                  <a:t>Power</a:t>
+                </a:r>
+              </a:p>
+              <a:p>
+                <a:pPr algn="ctr"/>
+                <a:r>
+                  <a:rPr lang="en-US" b="1" dirty="0" smtClean="0"/>
+                  <a:t>Switch</a:t>
+                </a:r>
+              </a:p>
+            </p:txBody>
+          </p:sp>
+          <p:sp>
+            <p:nvSpPr>
+              <p:cNvPr id="12" name="TextBox 11"/>
+              <p:cNvSpPr txBox="1"/>
+              <p:nvPr/>
+            </p:nvSpPr>
+            <p:spPr>
+              <a:xfrm>
+                <a:off x="1981200" y="5410200"/>
+                <a:ext cx="1216378" cy="646331"/>
+              </a:xfrm>
+              <a:prstGeom prst="rect">
+                <a:avLst/>
+              </a:prstGeom>
+              <a:solidFill>
+                <a:schemeClr val="bg1"/>
+              </a:solidFill>
+            </p:spPr>
+            <p:txBody>
+              <a:bodyPr wrap="square" rtlCol="0">
+                <a:spAutoFit/>
+              </a:bodyPr>
+              <a:lstStyle/>
+              <a:p>
+                <a:pPr algn="ctr"/>
+                <a:r>
+                  <a:rPr lang="en-US" b="1" dirty="0" smtClean="0"/>
+                  <a:t>User Pot</a:t>
+                </a:r>
+              </a:p>
+              <a:p>
+                <a:pPr algn="ctr"/>
+                <a:r>
+                  <a:rPr lang="en-US" b="1" dirty="0" smtClean="0"/>
+                  <a:t>(Volume)</a:t>
+                </a:r>
+              </a:p>
+            </p:txBody>
+          </p:sp>
+          <p:sp>
+            <p:nvSpPr>
+              <p:cNvPr id="13" name="TextBox 12"/>
+              <p:cNvSpPr txBox="1"/>
+              <p:nvPr/>
+            </p:nvSpPr>
+            <p:spPr>
+              <a:xfrm>
+                <a:off x="5492044" y="4648200"/>
+                <a:ext cx="1442156" cy="646331"/>
+              </a:xfrm>
+              <a:prstGeom prst="rect">
+                <a:avLst/>
+              </a:prstGeom>
+              <a:solidFill>
+                <a:schemeClr val="bg1"/>
+              </a:solidFill>
+            </p:spPr>
+            <p:txBody>
+              <a:bodyPr wrap="square" rtlCol="0">
+                <a:spAutoFit/>
+              </a:bodyPr>
+              <a:lstStyle/>
+              <a:p>
+                <a:pPr algn="ctr"/>
+                <a:r>
+                  <a:rPr lang="en-US" b="1" dirty="0" smtClean="0"/>
+                  <a:t>Bluetooth</a:t>
+                </a:r>
+              </a:p>
+              <a:p>
+                <a:pPr algn="ctr"/>
+                <a:r>
+                  <a:rPr lang="en-US" b="1" dirty="0" smtClean="0"/>
+                  <a:t>Classic</a:t>
+                </a:r>
+              </a:p>
+            </p:txBody>
+          </p:sp>
+          <p:sp>
+            <p:nvSpPr>
+              <p:cNvPr id="14" name="TextBox 13"/>
+              <p:cNvSpPr txBox="1"/>
+              <p:nvPr/>
+            </p:nvSpPr>
+            <p:spPr>
+              <a:xfrm>
+                <a:off x="5486400" y="2685365"/>
+                <a:ext cx="1442156" cy="646331"/>
+              </a:xfrm>
+              <a:prstGeom prst="rect">
+                <a:avLst/>
+              </a:prstGeom>
+              <a:noFill/>
+            </p:spPr>
+            <p:txBody>
+              <a:bodyPr wrap="square" rtlCol="0">
+                <a:spAutoFit/>
+              </a:bodyPr>
+              <a:lstStyle/>
+              <a:p>
+                <a:pPr algn="ctr"/>
+                <a:r>
+                  <a:rPr lang="en-US" b="1" dirty="0" smtClean="0"/>
+                  <a:t>On-Board Mic</a:t>
+                </a:r>
+              </a:p>
+            </p:txBody>
+          </p:sp>
+          <p:sp>
+            <p:nvSpPr>
+              <p:cNvPr id="16" name="TextBox 15"/>
+              <p:cNvSpPr txBox="1"/>
+              <p:nvPr/>
+            </p:nvSpPr>
+            <p:spPr>
+              <a:xfrm>
+                <a:off x="5053189" y="5576716"/>
+                <a:ext cx="1442156" cy="646331"/>
+              </a:xfrm>
+              <a:prstGeom prst="rect">
+                <a:avLst/>
+              </a:prstGeom>
+              <a:solidFill>
+                <a:schemeClr val="bg1"/>
+              </a:solidFill>
+            </p:spPr>
+            <p:txBody>
+              <a:bodyPr wrap="square" rtlCol="0">
+                <a:spAutoFit/>
+              </a:bodyPr>
+              <a:lstStyle/>
+              <a:p>
+                <a:pPr algn="ctr"/>
+                <a:r>
+                  <a:rPr lang="en-US" b="1" dirty="0" smtClean="0"/>
+                  <a:t>User</a:t>
+                </a:r>
+              </a:p>
+              <a:p>
+                <a:pPr algn="ctr"/>
+                <a:r>
+                  <a:rPr lang="en-US" b="1" dirty="0" smtClean="0"/>
+                  <a:t>LEDs</a:t>
+                </a:r>
+              </a:p>
+            </p:txBody>
+          </p:sp>
+          <p:cxnSp>
+            <p:nvCxnSpPr>
+              <p:cNvPr id="7" name="Straight Arrow Connector 6"/>
+              <p:cNvCxnSpPr>
+                <a:stCxn id="9" idx="2"/>
+              </p:cNvCxnSpPr>
+              <p:nvPr/>
+            </p:nvCxnSpPr>
+            <p:spPr>
+              <a:xfrm flipH="1">
+                <a:off x="4608689" y="2145124"/>
+                <a:ext cx="36689" cy="674276"/>
+              </a:xfrm>
+              <a:prstGeom prst="straightConnector1">
+                <a:avLst/>
+              </a:prstGeom>
+              <a:ln w="38100">
+                <a:solidFill>
+                  <a:srgbClr val="FF0000"/>
+                </a:solidFill>
+                <a:tailEnd type="arrow"/>
+              </a:ln>
+            </p:spPr>
+            <p:style>
+              <a:lnRef idx="1">
+                <a:schemeClr val="accent1"/>
+              </a:lnRef>
+              <a:fillRef idx="0">
+                <a:schemeClr val="accent1"/>
+              </a:fillRef>
+              <a:effectRef idx="0">
+                <a:schemeClr val="accent1"/>
+              </a:effectRef>
+              <a:fontRef idx="minor">
+                <a:schemeClr val="tx1"/>
+              </a:fontRef>
+            </p:style>
+          </p:cxnSp>
+          <p:cxnSp>
+            <p:nvCxnSpPr>
+              <p:cNvPr id="22" name="Straight Arrow Connector 21"/>
+              <p:cNvCxnSpPr/>
+              <p:nvPr/>
+            </p:nvCxnSpPr>
+            <p:spPr>
+              <a:xfrm>
+                <a:off x="3575756" y="2240280"/>
+                <a:ext cx="392854" cy="391745"/>
+              </a:xfrm>
+              <a:prstGeom prst="straightConnector1">
+                <a:avLst/>
+              </a:prstGeom>
+              <a:ln w="38100">
+                <a:solidFill>
+                  <a:srgbClr val="FF0000"/>
+                </a:solidFill>
+                <a:tailEnd type="arrow"/>
+              </a:ln>
+            </p:spPr>
+            <p:style>
+              <a:lnRef idx="1">
+                <a:schemeClr val="accent1"/>
+              </a:lnRef>
+              <a:fillRef idx="0">
+                <a:schemeClr val="accent1"/>
+              </a:fillRef>
+              <a:effectRef idx="0">
+                <a:schemeClr val="accent1"/>
+              </a:effectRef>
+              <a:fontRef idx="minor">
+                <a:schemeClr val="tx1"/>
+              </a:fontRef>
+            </p:style>
+          </p:cxnSp>
+          <p:cxnSp>
+            <p:nvCxnSpPr>
+              <p:cNvPr id="24" name="Straight Arrow Connector 23"/>
+              <p:cNvCxnSpPr/>
+              <p:nvPr/>
+            </p:nvCxnSpPr>
+            <p:spPr>
+              <a:xfrm>
+                <a:off x="3208020" y="3008530"/>
+                <a:ext cx="760590" cy="376788"/>
+              </a:xfrm>
+              <a:prstGeom prst="straightConnector1">
+                <a:avLst/>
+              </a:prstGeom>
+              <a:ln w="38100">
+                <a:solidFill>
+                  <a:srgbClr val="FF0000"/>
+                </a:solidFill>
+                <a:tailEnd type="arrow"/>
+              </a:ln>
+            </p:spPr>
+            <p:style>
+              <a:lnRef idx="1">
+                <a:schemeClr val="accent1"/>
+              </a:lnRef>
+              <a:fillRef idx="0">
+                <a:schemeClr val="accent1"/>
+              </a:fillRef>
+              <a:effectRef idx="0">
+                <a:schemeClr val="accent1"/>
+              </a:effectRef>
+              <a:fontRef idx="minor">
+                <a:schemeClr val="tx1"/>
+              </a:fontRef>
+            </p:style>
+          </p:cxnSp>
+          <p:cxnSp>
+            <p:nvCxnSpPr>
+              <p:cNvPr id="26" name="Straight Arrow Connector 25"/>
+              <p:cNvCxnSpPr/>
+              <p:nvPr/>
+            </p:nvCxnSpPr>
+            <p:spPr>
+              <a:xfrm>
+                <a:off x="3093720" y="3708484"/>
+                <a:ext cx="867975" cy="0"/>
+              </a:xfrm>
+              <a:prstGeom prst="straightConnector1">
+                <a:avLst/>
+              </a:prstGeom>
+              <a:ln w="38100">
+                <a:solidFill>
+                  <a:srgbClr val="FF0000"/>
+                </a:solidFill>
+                <a:tailEnd type="arrow"/>
+              </a:ln>
+            </p:spPr>
+            <p:style>
+              <a:lnRef idx="1">
+                <a:schemeClr val="accent1"/>
+              </a:lnRef>
+              <a:fillRef idx="0">
+                <a:schemeClr val="accent1"/>
+              </a:fillRef>
+              <a:effectRef idx="0">
+                <a:schemeClr val="accent1"/>
+              </a:effectRef>
+              <a:fontRef idx="minor">
+                <a:schemeClr val="tx1"/>
+              </a:fontRef>
+            </p:style>
+          </p:cxnSp>
+          <p:cxnSp>
+            <p:nvCxnSpPr>
+              <p:cNvPr id="28" name="Straight Arrow Connector 27"/>
+              <p:cNvCxnSpPr/>
+              <p:nvPr/>
+            </p:nvCxnSpPr>
+            <p:spPr>
+              <a:xfrm flipV="1">
+                <a:off x="3148013" y="5410200"/>
+                <a:ext cx="755827" cy="204788"/>
+              </a:xfrm>
+              <a:prstGeom prst="straightConnector1">
+                <a:avLst/>
+              </a:prstGeom>
+              <a:ln w="38100">
+                <a:solidFill>
+                  <a:srgbClr val="FF0000"/>
+                </a:solidFill>
+                <a:tailEnd type="arrow"/>
+              </a:ln>
+            </p:spPr>
+            <p:style>
+              <a:lnRef idx="1">
+                <a:schemeClr val="accent1"/>
+              </a:lnRef>
+              <a:fillRef idx="0">
+                <a:schemeClr val="accent1"/>
+              </a:fillRef>
+              <a:effectRef idx="0">
+                <a:schemeClr val="accent1"/>
+              </a:effectRef>
+              <a:fontRef idx="minor">
+                <a:schemeClr val="tx1"/>
+              </a:fontRef>
+            </p:style>
+          </p:cxnSp>
+          <p:cxnSp>
+            <p:nvCxnSpPr>
+              <p:cNvPr id="30" name="Straight Arrow Connector 29"/>
+              <p:cNvCxnSpPr/>
+              <p:nvPr/>
+            </p:nvCxnSpPr>
+            <p:spPr>
+              <a:xfrm flipH="1" flipV="1">
+                <a:off x="4831644" y="5733367"/>
+                <a:ext cx="496712" cy="83256"/>
+              </a:xfrm>
+              <a:prstGeom prst="straightConnector1">
+                <a:avLst/>
+              </a:prstGeom>
+              <a:ln w="38100">
+                <a:solidFill>
+                  <a:srgbClr val="FF0000"/>
+                </a:solidFill>
+                <a:tailEnd type="arrow"/>
+              </a:ln>
+            </p:spPr>
+            <p:style>
+              <a:lnRef idx="1">
+                <a:schemeClr val="accent1"/>
+              </a:lnRef>
+              <a:fillRef idx="0">
+                <a:schemeClr val="accent1"/>
+              </a:fillRef>
+              <a:effectRef idx="0">
+                <a:schemeClr val="accent1"/>
+              </a:effectRef>
+              <a:fontRef idx="minor">
+                <a:schemeClr val="tx1"/>
+              </a:fontRef>
+            </p:style>
+          </p:cxnSp>
+          <p:cxnSp>
+            <p:nvCxnSpPr>
+              <p:cNvPr id="34" name="Straight Arrow Connector 33"/>
+              <p:cNvCxnSpPr/>
+              <p:nvPr/>
+            </p:nvCxnSpPr>
+            <p:spPr>
+              <a:xfrm flipH="1">
+                <a:off x="4831644" y="5054621"/>
+                <a:ext cx="883356" cy="239910"/>
+              </a:xfrm>
+              <a:prstGeom prst="straightConnector1">
+                <a:avLst/>
+              </a:prstGeom>
+              <a:ln w="38100">
+                <a:solidFill>
+                  <a:srgbClr val="FF0000"/>
+                </a:solidFill>
+                <a:tailEnd type="arrow"/>
+              </a:ln>
+            </p:spPr>
+            <p:style>
+              <a:lnRef idx="1">
+                <a:schemeClr val="accent1"/>
+              </a:lnRef>
+              <a:fillRef idx="0">
+                <a:schemeClr val="accent1"/>
+              </a:fillRef>
+              <a:effectRef idx="0">
+                <a:schemeClr val="accent1"/>
+              </a:effectRef>
+              <a:fontRef idx="minor">
+                <a:schemeClr val="tx1"/>
+              </a:fontRef>
+            </p:style>
+          </p:cxnSp>
+          <p:cxnSp>
+            <p:nvCxnSpPr>
+              <p:cNvPr id="36" name="Straight Arrow Connector 35"/>
+              <p:cNvCxnSpPr/>
+              <p:nvPr/>
+            </p:nvCxnSpPr>
+            <p:spPr>
+              <a:xfrm flipH="1">
+                <a:off x="5080000" y="3091786"/>
+                <a:ext cx="635000" cy="325308"/>
+              </a:xfrm>
+              <a:prstGeom prst="straightConnector1">
+                <a:avLst/>
+              </a:prstGeom>
+              <a:ln w="38100">
+                <a:solidFill>
+                  <a:srgbClr val="FF0000"/>
+                </a:solidFill>
+                <a:tailEnd type="arrow"/>
+              </a:ln>
+            </p:spPr>
+            <p:style>
+              <a:lnRef idx="1">
+                <a:schemeClr val="accent1"/>
+              </a:lnRef>
+              <a:fillRef idx="0">
+                <a:schemeClr val="accent1"/>
+              </a:fillRef>
+              <a:effectRef idx="0">
+                <a:schemeClr val="accent1"/>
+              </a:effectRef>
+              <a:fontRef idx="minor">
+                <a:schemeClr val="tx1"/>
+              </a:fontRef>
+            </p:style>
+          </p:cxnSp>
+          <p:cxnSp>
+            <p:nvCxnSpPr>
+              <p:cNvPr id="39" name="Straight Arrow Connector 38"/>
+              <p:cNvCxnSpPr/>
+              <p:nvPr/>
+            </p:nvCxnSpPr>
+            <p:spPr>
+              <a:xfrm flipH="1">
+                <a:off x="5174544" y="2240280"/>
+                <a:ext cx="635000" cy="350520"/>
+              </a:xfrm>
+              <a:prstGeom prst="straightConnector1">
+                <a:avLst/>
+              </a:prstGeom>
+              <a:ln w="38100">
+                <a:solidFill>
+                  <a:srgbClr val="FF0000"/>
+                </a:solidFill>
+                <a:tailEnd type="arrow"/>
+              </a:ln>
+            </p:spPr>
+            <p:style>
+              <a:lnRef idx="1">
+                <a:schemeClr val="accent1"/>
+              </a:lnRef>
+              <a:fillRef idx="0">
+                <a:schemeClr val="accent1"/>
+              </a:fillRef>
+              <a:effectRef idx="0">
+                <a:schemeClr val="accent1"/>
+              </a:effectRef>
+              <a:fontRef idx="minor">
+                <a:schemeClr val="tx1"/>
+              </a:fontRef>
+            </p:style>
+          </p:cxnSp>
+        </p:grpSp>
+      </p:grpSp>
       <p:sp>
         <p:nvSpPr>
           <p:cNvPr id="3" name="Title 2"/>
@@ -3211,7 +3982,12 @@
             <p:ph type="title"/>
           </p:nvPr>
         </p:nvSpPr>
-        <p:spPr/>
+        <p:spPr>
+          <a:xfrm>
+            <a:off x="1549400" y="558800"/>
+            <a:ext cx="7048500" cy="858838"/>
+          </a:xfrm>
+        </p:spPr>
         <p:txBody>
           <a:bodyPr/>
           <a:lstStyle/>
@@ -3232,7 +4008,7 @@
         </p:nvGrpSpPr>
         <p:grpSpPr>
           <a:xfrm>
-            <a:off x="7136286" y="3554606"/>
+            <a:off x="6907686" y="3580006"/>
             <a:ext cx="1451958" cy="2409619"/>
             <a:chOff x="7237887" y="3475583"/>
             <a:chExt cx="1451958" cy="2409619"/>
@@ -3247,11 +4023,11 @@
             <p:nvPr/>
           </p:nvPicPr>
           <p:blipFill rotWithShape="1">
-            <a:blip r:embed="rId2" cstate="print">
+            <a:blip r:embed="rId4" cstate="print">
               <a:extLst>
                 <a:ext uri="{BEBA8EAE-BF5A-486C-A8C5-ECC9F3942E4B}">
                   <a14:imgProps xmlns:a14="http://schemas.microsoft.com/office/drawing/2010/main">
-                    <a14:imgLayer r:embed="rId3">
+                    <a14:imgLayer r:embed="rId5">
                       <a14:imgEffect>
                         <a14:backgroundRemoval t="11285" b="81534" l="28756" r="71747">
                           <a14:backgroundMark x1="32333" y1="39326" x2="41417" y2="35206"/>
@@ -3338,716 +4114,6 @@
           </p:txBody>
         </p:sp>
       </p:grpSp>
-      <p:grpSp>
-        <p:nvGrpSpPr>
-          <p:cNvPr id="2056" name="Group 2055"/>
-          <p:cNvGrpSpPr/>
-          <p:nvPr/>
-        </p:nvGrpSpPr>
-        <p:grpSpPr>
-          <a:xfrm>
-            <a:off x="1871133" y="1467631"/>
-            <a:ext cx="5252156" cy="4744127"/>
-            <a:chOff x="1905000" y="1478920"/>
-            <a:chExt cx="5252156" cy="4744127"/>
-          </a:xfrm>
-        </p:grpSpPr>
-        <p:pic>
-          <p:nvPicPr>
-            <p:cNvPr id="2051" name="Picture 3" descr="C:\Users\wea\Desktop\2017-02-10 Tympan A to BTNRH\IMG_7257.JPG"/>
-            <p:cNvPicPr>
-              <a:picLocks noChangeAspect="1" noChangeArrowheads="1"/>
-            </p:cNvPicPr>
-            <p:nvPr/>
-          </p:nvPicPr>
-          <p:blipFill rotWithShape="1">
-            <a:blip r:embed="rId4">
-              <a:extLst>
-                <a:ext uri="{BEBA8EAE-BF5A-486C-A8C5-ECC9F3942E4B}">
-                  <a14:imgProps xmlns:a14="http://schemas.microsoft.com/office/drawing/2010/main">
-                    <a14:imgLayer r:embed="rId5">
-                      <a14:imgEffect>
-                        <a14:backgroundRemoval t="10000" b="99250" l="6583" r="75917">
-                          <a14:foregroundMark x1="61333" y1="44500" x2="62833" y2="39250"/>
-                          <a14:foregroundMark x1="61083" y1="65250" x2="61167" y2="60875"/>
-                          <a14:foregroundMark x1="59167" y1="77750" x2="58833" y2="75125"/>
-                          <a14:foregroundMark x1="48167" y1="88125" x2="30250" y2="96000"/>
-                          <a14:foregroundMark x1="13000" y1="95250" x2="24500" y2="66625"/>
-                          <a14:foregroundMark x1="38417" y1="99250" x2="14417" y2="98125"/>
-                          <a14:foregroundMark x1="6583" y1="99250" x2="10500" y2="88500"/>
-                        </a14:backgroundRemoval>
-                      </a14:imgEffect>
-                    </a14:imgLayer>
-                  </a14:imgProps>
-                </a:ext>
-                <a:ext uri="{28A0092B-C50C-407E-A947-70E740481C1C}">
-                  <a14:useLocalDpi xmlns:a14="http://schemas.microsoft.com/office/drawing/2010/main" val="0"/>
-                </a:ext>
-              </a:extLst>
-            </a:blip>
-            <a:srcRect l="22962" r="17953" b="9952"/>
-            <a:stretch/>
-          </p:blipFill>
-          <p:spPr bwMode="auto">
-            <a:xfrm>
-              <a:off x="2362200" y="1478920"/>
-              <a:ext cx="4566356" cy="4639658"/>
-            </a:xfrm>
-            <a:prstGeom prst="rect">
-              <a:avLst/>
-            </a:prstGeom>
-            <a:noFill/>
-            <a:extLst>
-              <a:ext uri="{909E8E84-426E-40DD-AFC4-6F175D3DCCD1}">
-                <a14:hiddenFill xmlns:a14="http://schemas.microsoft.com/office/drawing/2010/main">
-                  <a:solidFill>
-                    <a:srgbClr val="FFFFFF"/>
-                  </a:solidFill>
-                </a14:hiddenFill>
-              </a:ext>
-            </a:extLst>
-          </p:spPr>
-        </p:pic>
-        <p:sp>
-          <p:nvSpPr>
-            <p:cNvPr id="5" name="TextBox 4"/>
-            <p:cNvSpPr txBox="1"/>
-            <p:nvPr/>
-          </p:nvSpPr>
-          <p:spPr>
-            <a:xfrm>
-              <a:off x="2362200" y="1715869"/>
-              <a:ext cx="1219200" cy="646331"/>
-            </a:xfrm>
-            <a:prstGeom prst="rect">
-              <a:avLst/>
-            </a:prstGeom>
-            <a:noFill/>
-          </p:spPr>
-          <p:txBody>
-            <a:bodyPr wrap="square" rtlCol="0">
-              <a:spAutoFit/>
-            </a:bodyPr>
-            <a:lstStyle/>
-            <a:p>
-              <a:pPr algn="ctr"/>
-              <a:r>
-                <a:rPr lang="en-US" b="1" dirty="0" smtClean="0"/>
-                <a:t>Line-In / Mic Jack</a:t>
-              </a:r>
-              <a:endParaRPr lang="en-US" b="1" dirty="0"/>
-            </a:p>
-          </p:txBody>
-        </p:sp>
-        <p:sp>
-          <p:nvSpPr>
-            <p:cNvPr id="8" name="TextBox 7"/>
-            <p:cNvSpPr txBox="1"/>
-            <p:nvPr/>
-          </p:nvSpPr>
-          <p:spPr>
-            <a:xfrm>
-              <a:off x="5715000" y="1715869"/>
-              <a:ext cx="1442156" cy="646331"/>
-            </a:xfrm>
-            <a:prstGeom prst="rect">
-              <a:avLst/>
-            </a:prstGeom>
-            <a:noFill/>
-          </p:spPr>
-          <p:txBody>
-            <a:bodyPr wrap="square" rtlCol="0">
-              <a:spAutoFit/>
-            </a:bodyPr>
-            <a:lstStyle/>
-            <a:p>
-              <a:pPr algn="ctr"/>
-              <a:r>
-                <a:rPr lang="en-US" b="1" dirty="0" smtClean="0"/>
-                <a:t>Headphone Jack</a:t>
-              </a:r>
-              <a:endParaRPr lang="en-US" b="1" dirty="0"/>
-            </a:p>
-          </p:txBody>
-        </p:sp>
-        <p:sp>
-          <p:nvSpPr>
-            <p:cNvPr id="9" name="TextBox 8"/>
-            <p:cNvSpPr txBox="1"/>
-            <p:nvPr/>
-          </p:nvSpPr>
-          <p:spPr>
-            <a:xfrm>
-              <a:off x="3575756" y="1498793"/>
-              <a:ext cx="2139244" cy="646331"/>
-            </a:xfrm>
-            <a:prstGeom prst="rect">
-              <a:avLst/>
-            </a:prstGeom>
-            <a:noFill/>
-          </p:spPr>
-          <p:txBody>
-            <a:bodyPr wrap="square" rtlCol="0">
-              <a:spAutoFit/>
-            </a:bodyPr>
-            <a:lstStyle/>
-            <a:p>
-              <a:pPr algn="ctr"/>
-              <a:r>
-                <a:rPr lang="en-US" b="1" dirty="0" smtClean="0"/>
-                <a:t>USB to</a:t>
-              </a:r>
-            </a:p>
-            <a:p>
-              <a:pPr algn="ctr"/>
-              <a:r>
-                <a:rPr lang="en-US" b="1" dirty="0" smtClean="0"/>
-                <a:t>Program/Recharge</a:t>
-              </a:r>
-            </a:p>
-          </p:txBody>
-        </p:sp>
-        <p:sp>
-          <p:nvSpPr>
-            <p:cNvPr id="10" name="TextBox 9"/>
-            <p:cNvSpPr txBox="1"/>
-            <p:nvPr/>
-          </p:nvSpPr>
-          <p:spPr>
-            <a:xfrm>
-              <a:off x="1981200" y="2590800"/>
-              <a:ext cx="1442156" cy="646331"/>
-            </a:xfrm>
-            <a:prstGeom prst="rect">
-              <a:avLst/>
-            </a:prstGeom>
-            <a:noFill/>
-          </p:spPr>
-          <p:txBody>
-            <a:bodyPr wrap="square" rtlCol="0">
-              <a:spAutoFit/>
-            </a:bodyPr>
-            <a:lstStyle/>
-            <a:p>
-              <a:pPr algn="ctr"/>
-              <a:r>
-                <a:rPr lang="en-US" b="1" dirty="0" smtClean="0"/>
-                <a:t>On-Board Mic</a:t>
-              </a:r>
-            </a:p>
-          </p:txBody>
-        </p:sp>
-        <p:sp>
-          <p:nvSpPr>
-            <p:cNvPr id="11" name="TextBox 10"/>
-            <p:cNvSpPr txBox="1"/>
-            <p:nvPr/>
-          </p:nvSpPr>
-          <p:spPr>
-            <a:xfrm>
-              <a:off x="1905000" y="3385318"/>
-              <a:ext cx="1442156" cy="646331"/>
-            </a:xfrm>
-            <a:prstGeom prst="rect">
-              <a:avLst/>
-            </a:prstGeom>
-            <a:noFill/>
-          </p:spPr>
-          <p:txBody>
-            <a:bodyPr wrap="square" rtlCol="0">
-              <a:spAutoFit/>
-            </a:bodyPr>
-            <a:lstStyle/>
-            <a:p>
-              <a:pPr algn="ctr"/>
-              <a:r>
-                <a:rPr lang="en-US" b="1" dirty="0" smtClean="0"/>
-                <a:t>Power</a:t>
-              </a:r>
-            </a:p>
-            <a:p>
-              <a:pPr algn="ctr"/>
-              <a:r>
-                <a:rPr lang="en-US" b="1" dirty="0" smtClean="0"/>
-                <a:t>Switch</a:t>
-              </a:r>
-            </a:p>
-          </p:txBody>
-        </p:sp>
-        <p:sp>
-          <p:nvSpPr>
-            <p:cNvPr id="12" name="TextBox 11"/>
-            <p:cNvSpPr txBox="1"/>
-            <p:nvPr/>
-          </p:nvSpPr>
-          <p:spPr>
-            <a:xfrm>
-              <a:off x="1981200" y="5410200"/>
-              <a:ext cx="1216378" cy="646331"/>
-            </a:xfrm>
-            <a:prstGeom prst="rect">
-              <a:avLst/>
-            </a:prstGeom>
-            <a:solidFill>
-              <a:schemeClr val="bg1"/>
-            </a:solidFill>
-          </p:spPr>
-          <p:txBody>
-            <a:bodyPr wrap="square" rtlCol="0">
-              <a:spAutoFit/>
-            </a:bodyPr>
-            <a:lstStyle/>
-            <a:p>
-              <a:pPr algn="ctr"/>
-              <a:r>
-                <a:rPr lang="en-US" b="1" dirty="0" smtClean="0"/>
-                <a:t>User Pot</a:t>
-              </a:r>
-            </a:p>
-            <a:p>
-              <a:pPr algn="ctr"/>
-              <a:r>
-                <a:rPr lang="en-US" b="1" dirty="0" smtClean="0"/>
-                <a:t>(Volume)</a:t>
-              </a:r>
-            </a:p>
-          </p:txBody>
-        </p:sp>
-        <p:sp>
-          <p:nvSpPr>
-            <p:cNvPr id="13" name="TextBox 12"/>
-            <p:cNvSpPr txBox="1"/>
-            <p:nvPr/>
-          </p:nvSpPr>
-          <p:spPr>
-            <a:xfrm>
-              <a:off x="5492044" y="4648200"/>
-              <a:ext cx="1442156" cy="646331"/>
-            </a:xfrm>
-            <a:prstGeom prst="rect">
-              <a:avLst/>
-            </a:prstGeom>
-            <a:solidFill>
-              <a:schemeClr val="bg1"/>
-            </a:solidFill>
-          </p:spPr>
-          <p:txBody>
-            <a:bodyPr wrap="square" rtlCol="0">
-              <a:spAutoFit/>
-            </a:bodyPr>
-            <a:lstStyle/>
-            <a:p>
-              <a:pPr algn="ctr"/>
-              <a:r>
-                <a:rPr lang="en-US" b="1" dirty="0" smtClean="0"/>
-                <a:t>Bluetooth</a:t>
-              </a:r>
-            </a:p>
-            <a:p>
-              <a:pPr algn="ctr"/>
-              <a:r>
-                <a:rPr lang="en-US" b="1" dirty="0" smtClean="0"/>
-                <a:t>Classic</a:t>
-              </a:r>
-            </a:p>
-          </p:txBody>
-        </p:sp>
-        <p:sp>
-          <p:nvSpPr>
-            <p:cNvPr id="14" name="TextBox 13"/>
-            <p:cNvSpPr txBox="1"/>
-            <p:nvPr/>
-          </p:nvSpPr>
-          <p:spPr>
-            <a:xfrm>
-              <a:off x="5486400" y="2685365"/>
-              <a:ext cx="1442156" cy="646331"/>
-            </a:xfrm>
-            <a:prstGeom prst="rect">
-              <a:avLst/>
-            </a:prstGeom>
-            <a:noFill/>
-          </p:spPr>
-          <p:txBody>
-            <a:bodyPr wrap="square" rtlCol="0">
-              <a:spAutoFit/>
-            </a:bodyPr>
-            <a:lstStyle/>
-            <a:p>
-              <a:pPr algn="ctr"/>
-              <a:r>
-                <a:rPr lang="en-US" b="1" dirty="0" smtClean="0"/>
-                <a:t>On-Board Mic</a:t>
-              </a:r>
-            </a:p>
-          </p:txBody>
-        </p:sp>
-        <p:sp>
-          <p:nvSpPr>
-            <p:cNvPr id="16" name="TextBox 15"/>
-            <p:cNvSpPr txBox="1"/>
-            <p:nvPr/>
-          </p:nvSpPr>
-          <p:spPr>
-            <a:xfrm>
-              <a:off x="5053189" y="5576716"/>
-              <a:ext cx="1442156" cy="646331"/>
-            </a:xfrm>
-            <a:prstGeom prst="rect">
-              <a:avLst/>
-            </a:prstGeom>
-            <a:solidFill>
-              <a:schemeClr val="bg1"/>
-            </a:solidFill>
-          </p:spPr>
-          <p:txBody>
-            <a:bodyPr wrap="square" rtlCol="0">
-              <a:spAutoFit/>
-            </a:bodyPr>
-            <a:lstStyle/>
-            <a:p>
-              <a:pPr algn="ctr"/>
-              <a:r>
-                <a:rPr lang="en-US" b="1" dirty="0" smtClean="0"/>
-                <a:t>User</a:t>
-              </a:r>
-            </a:p>
-            <a:p>
-              <a:pPr algn="ctr"/>
-              <a:r>
-                <a:rPr lang="en-US" b="1" dirty="0" smtClean="0"/>
-                <a:t>LEDs</a:t>
-              </a:r>
-            </a:p>
-          </p:txBody>
-        </p:sp>
-        <p:cxnSp>
-          <p:nvCxnSpPr>
-            <p:cNvPr id="7" name="Straight Arrow Connector 6"/>
-            <p:cNvCxnSpPr>
-              <a:stCxn id="9" idx="2"/>
-            </p:cNvCxnSpPr>
-            <p:nvPr/>
-          </p:nvCxnSpPr>
-          <p:spPr>
-            <a:xfrm flipH="1">
-              <a:off x="4608689" y="2145124"/>
-              <a:ext cx="36689" cy="674276"/>
-            </a:xfrm>
-            <a:prstGeom prst="straightConnector1">
-              <a:avLst/>
-            </a:prstGeom>
-            <a:ln w="38100">
-              <a:solidFill>
-                <a:srgbClr val="FF0000"/>
-              </a:solidFill>
-              <a:tailEnd type="arrow"/>
-            </a:ln>
-          </p:spPr>
-          <p:style>
-            <a:lnRef idx="1">
-              <a:schemeClr val="accent1"/>
-            </a:lnRef>
-            <a:fillRef idx="0">
-              <a:schemeClr val="accent1"/>
-            </a:fillRef>
-            <a:effectRef idx="0">
-              <a:schemeClr val="accent1"/>
-            </a:effectRef>
-            <a:fontRef idx="minor">
-              <a:schemeClr val="tx1"/>
-            </a:fontRef>
-          </p:style>
-        </p:cxnSp>
-        <p:cxnSp>
-          <p:nvCxnSpPr>
-            <p:cNvPr id="22" name="Straight Arrow Connector 21"/>
-            <p:cNvCxnSpPr/>
-            <p:nvPr/>
-          </p:nvCxnSpPr>
-          <p:spPr>
-            <a:xfrm>
-              <a:off x="3575756" y="2240280"/>
-              <a:ext cx="392854" cy="391745"/>
-            </a:xfrm>
-            <a:prstGeom prst="straightConnector1">
-              <a:avLst/>
-            </a:prstGeom>
-            <a:ln w="38100">
-              <a:solidFill>
-                <a:srgbClr val="FF0000"/>
-              </a:solidFill>
-              <a:tailEnd type="arrow"/>
-            </a:ln>
-          </p:spPr>
-          <p:style>
-            <a:lnRef idx="1">
-              <a:schemeClr val="accent1"/>
-            </a:lnRef>
-            <a:fillRef idx="0">
-              <a:schemeClr val="accent1"/>
-            </a:fillRef>
-            <a:effectRef idx="0">
-              <a:schemeClr val="accent1"/>
-            </a:effectRef>
-            <a:fontRef idx="minor">
-              <a:schemeClr val="tx1"/>
-            </a:fontRef>
-          </p:style>
-        </p:cxnSp>
-        <p:cxnSp>
-          <p:nvCxnSpPr>
-            <p:cNvPr id="24" name="Straight Arrow Connector 23"/>
-            <p:cNvCxnSpPr/>
-            <p:nvPr/>
-          </p:nvCxnSpPr>
-          <p:spPr>
-            <a:xfrm>
-              <a:off x="3208020" y="3008530"/>
-              <a:ext cx="760590" cy="376788"/>
-            </a:xfrm>
-            <a:prstGeom prst="straightConnector1">
-              <a:avLst/>
-            </a:prstGeom>
-            <a:ln w="38100">
-              <a:solidFill>
-                <a:srgbClr val="FF0000"/>
-              </a:solidFill>
-              <a:tailEnd type="arrow"/>
-            </a:ln>
-          </p:spPr>
-          <p:style>
-            <a:lnRef idx="1">
-              <a:schemeClr val="accent1"/>
-            </a:lnRef>
-            <a:fillRef idx="0">
-              <a:schemeClr val="accent1"/>
-            </a:fillRef>
-            <a:effectRef idx="0">
-              <a:schemeClr val="accent1"/>
-            </a:effectRef>
-            <a:fontRef idx="minor">
-              <a:schemeClr val="tx1"/>
-            </a:fontRef>
-          </p:style>
-        </p:cxnSp>
-        <p:cxnSp>
-          <p:nvCxnSpPr>
-            <p:cNvPr id="26" name="Straight Arrow Connector 25"/>
-            <p:cNvCxnSpPr/>
-            <p:nvPr/>
-          </p:nvCxnSpPr>
-          <p:spPr>
-            <a:xfrm>
-              <a:off x="3093720" y="3708484"/>
-              <a:ext cx="867975" cy="0"/>
-            </a:xfrm>
-            <a:prstGeom prst="straightConnector1">
-              <a:avLst/>
-            </a:prstGeom>
-            <a:ln w="38100">
-              <a:solidFill>
-                <a:srgbClr val="FF0000"/>
-              </a:solidFill>
-              <a:tailEnd type="arrow"/>
-            </a:ln>
-          </p:spPr>
-          <p:style>
-            <a:lnRef idx="1">
-              <a:schemeClr val="accent1"/>
-            </a:lnRef>
-            <a:fillRef idx="0">
-              <a:schemeClr val="accent1"/>
-            </a:fillRef>
-            <a:effectRef idx="0">
-              <a:schemeClr val="accent1"/>
-            </a:effectRef>
-            <a:fontRef idx="minor">
-              <a:schemeClr val="tx1"/>
-            </a:fontRef>
-          </p:style>
-        </p:cxnSp>
-        <p:cxnSp>
-          <p:nvCxnSpPr>
-            <p:cNvPr id="28" name="Straight Arrow Connector 27"/>
-            <p:cNvCxnSpPr/>
-            <p:nvPr/>
-          </p:nvCxnSpPr>
-          <p:spPr>
-            <a:xfrm flipV="1">
-              <a:off x="3148013" y="5410200"/>
-              <a:ext cx="755827" cy="204788"/>
-            </a:xfrm>
-            <a:prstGeom prst="straightConnector1">
-              <a:avLst/>
-            </a:prstGeom>
-            <a:ln w="38100">
-              <a:solidFill>
-                <a:srgbClr val="FF0000"/>
-              </a:solidFill>
-              <a:tailEnd type="arrow"/>
-            </a:ln>
-          </p:spPr>
-          <p:style>
-            <a:lnRef idx="1">
-              <a:schemeClr val="accent1"/>
-            </a:lnRef>
-            <a:fillRef idx="0">
-              <a:schemeClr val="accent1"/>
-            </a:fillRef>
-            <a:effectRef idx="0">
-              <a:schemeClr val="accent1"/>
-            </a:effectRef>
-            <a:fontRef idx="minor">
-              <a:schemeClr val="tx1"/>
-            </a:fontRef>
-          </p:style>
-        </p:cxnSp>
-        <p:cxnSp>
-          <p:nvCxnSpPr>
-            <p:cNvPr id="30" name="Straight Arrow Connector 29"/>
-            <p:cNvCxnSpPr/>
-            <p:nvPr/>
-          </p:nvCxnSpPr>
-          <p:spPr>
-            <a:xfrm flipH="1" flipV="1">
-              <a:off x="4831644" y="5733367"/>
-              <a:ext cx="496712" cy="83256"/>
-            </a:xfrm>
-            <a:prstGeom prst="straightConnector1">
-              <a:avLst/>
-            </a:prstGeom>
-            <a:ln w="38100">
-              <a:solidFill>
-                <a:srgbClr val="FF0000"/>
-              </a:solidFill>
-              <a:tailEnd type="arrow"/>
-            </a:ln>
-          </p:spPr>
-          <p:style>
-            <a:lnRef idx="1">
-              <a:schemeClr val="accent1"/>
-            </a:lnRef>
-            <a:fillRef idx="0">
-              <a:schemeClr val="accent1"/>
-            </a:fillRef>
-            <a:effectRef idx="0">
-              <a:schemeClr val="accent1"/>
-            </a:effectRef>
-            <a:fontRef idx="minor">
-              <a:schemeClr val="tx1"/>
-            </a:fontRef>
-          </p:style>
-        </p:cxnSp>
-        <p:cxnSp>
-          <p:nvCxnSpPr>
-            <p:cNvPr id="34" name="Straight Arrow Connector 33"/>
-            <p:cNvCxnSpPr/>
-            <p:nvPr/>
-          </p:nvCxnSpPr>
-          <p:spPr>
-            <a:xfrm flipH="1">
-              <a:off x="4831644" y="5054621"/>
-              <a:ext cx="883356" cy="239910"/>
-            </a:xfrm>
-            <a:prstGeom prst="straightConnector1">
-              <a:avLst/>
-            </a:prstGeom>
-            <a:ln w="38100">
-              <a:solidFill>
-                <a:srgbClr val="FF0000"/>
-              </a:solidFill>
-              <a:tailEnd type="arrow"/>
-            </a:ln>
-          </p:spPr>
-          <p:style>
-            <a:lnRef idx="1">
-              <a:schemeClr val="accent1"/>
-            </a:lnRef>
-            <a:fillRef idx="0">
-              <a:schemeClr val="accent1"/>
-            </a:fillRef>
-            <a:effectRef idx="0">
-              <a:schemeClr val="accent1"/>
-            </a:effectRef>
-            <a:fontRef idx="minor">
-              <a:schemeClr val="tx1"/>
-            </a:fontRef>
-          </p:style>
-        </p:cxnSp>
-        <p:cxnSp>
-          <p:nvCxnSpPr>
-            <p:cNvPr id="36" name="Straight Arrow Connector 35"/>
-            <p:cNvCxnSpPr/>
-            <p:nvPr/>
-          </p:nvCxnSpPr>
-          <p:spPr>
-            <a:xfrm flipH="1">
-              <a:off x="5080000" y="3091786"/>
-              <a:ext cx="635000" cy="325308"/>
-            </a:xfrm>
-            <a:prstGeom prst="straightConnector1">
-              <a:avLst/>
-            </a:prstGeom>
-            <a:ln w="38100">
-              <a:solidFill>
-                <a:srgbClr val="FF0000"/>
-              </a:solidFill>
-              <a:tailEnd type="arrow"/>
-            </a:ln>
-          </p:spPr>
-          <p:style>
-            <a:lnRef idx="1">
-              <a:schemeClr val="accent1"/>
-            </a:lnRef>
-            <a:fillRef idx="0">
-              <a:schemeClr val="accent1"/>
-            </a:fillRef>
-            <a:effectRef idx="0">
-              <a:schemeClr val="accent1"/>
-            </a:effectRef>
-            <a:fontRef idx="minor">
-              <a:schemeClr val="tx1"/>
-            </a:fontRef>
-          </p:style>
-        </p:cxnSp>
-        <p:cxnSp>
-          <p:nvCxnSpPr>
-            <p:cNvPr id="39" name="Straight Arrow Connector 38"/>
-            <p:cNvCxnSpPr/>
-            <p:nvPr/>
-          </p:nvCxnSpPr>
-          <p:spPr>
-            <a:xfrm flipH="1">
-              <a:off x="5174544" y="2240280"/>
-              <a:ext cx="635000" cy="350520"/>
-            </a:xfrm>
-            <a:prstGeom prst="straightConnector1">
-              <a:avLst/>
-            </a:prstGeom>
-            <a:ln w="38100">
-              <a:solidFill>
-                <a:srgbClr val="FF0000"/>
-              </a:solidFill>
-              <a:tailEnd type="arrow"/>
-            </a:ln>
-          </p:spPr>
-          <p:style>
-            <a:lnRef idx="1">
-              <a:schemeClr val="accent1"/>
-            </a:lnRef>
-            <a:fillRef idx="0">
-              <a:schemeClr val="accent1"/>
-            </a:fillRef>
-            <a:effectRef idx="0">
-              <a:schemeClr val="accent1"/>
-            </a:effectRef>
-            <a:fontRef idx="minor">
-              <a:schemeClr val="tx1"/>
-            </a:fontRef>
-          </p:style>
-        </p:cxnSp>
-      </p:grpSp>
     </p:spTree>
     <p:extLst>
       <p:ext uri="{BB962C8B-B14F-4D97-AF65-F5344CB8AC3E}">
@@ -4454,8 +4520,8 @@
         </p:nvSpPr>
         <p:spPr>
           <a:xfrm>
-            <a:off x="457200" y="82725"/>
-            <a:ext cx="8229600" cy="1143000"/>
+            <a:off x="508000" y="-6175"/>
+            <a:ext cx="8001000" cy="1143000"/>
           </a:xfrm>
         </p:spPr>
         <p:txBody>
@@ -4483,7 +4549,7 @@
         <p:spPr>
           <a:xfrm>
             <a:off x="3268133" y="1016000"/>
-            <a:ext cx="5695244" cy="5571067"/>
+            <a:ext cx="5342467" cy="5571067"/>
           </a:xfrm>
         </p:spPr>
         <p:txBody>

</xml_diff>